<commit_message>
minor changes in the notebooks
minor changes in the notebooks
</commit_message>
<xml_diff>
--- a/Presentations/AI Course Outline.pptx
+++ b/Presentations/AI Course Outline.pptx
@@ -219,7 +219,7 @@
           <a:p>
             <a:fld id="{C8D18E60-4300-4729-A0D7-6AB984C3922D}" type="datetimeFigureOut">
               <a:rPr lang="en-US" smtClean="0"/>
-              <a:t>2/15/2022</a:t>
+              <a:t>3/19/2022</a:t>
             </a:fld>
             <a:endParaRPr lang="en-US"/>
           </a:p>
@@ -805,7 +805,7 @@
             <a:fld id="{53074F12-AA26-4AC8-9962-C36BB8F32554}" type="datetimeFigureOut">
               <a:rPr lang="en-US" smtClean="0"/>
               <a:pPr/>
-              <a:t>2/15/2022</a:t>
+              <a:t>3/19/2022</a:t>
             </a:fld>
             <a:endParaRPr lang="en-US"/>
           </a:p>
@@ -1071,7 +1071,7 @@
             <a:fld id="{53074F12-AA26-4AC8-9962-C36BB8F32554}" type="datetimeFigureOut">
               <a:rPr lang="en-US" smtClean="0"/>
               <a:pPr/>
-              <a:t>2/15/2022</a:t>
+              <a:t>3/19/2022</a:t>
             </a:fld>
             <a:endParaRPr lang="en-US"/>
           </a:p>
@@ -1253,7 +1253,7 @@
             <a:fld id="{53074F12-AA26-4AC8-9962-C36BB8F32554}" type="datetimeFigureOut">
               <a:rPr lang="en-US" smtClean="0"/>
               <a:pPr/>
-              <a:t>2/15/2022</a:t>
+              <a:t>3/19/2022</a:t>
             </a:fld>
             <a:endParaRPr lang="en-US"/>
           </a:p>
@@ -1445,7 +1445,7 @@
             <a:fld id="{53074F12-AA26-4AC8-9962-C36BB8F32554}" type="datetimeFigureOut">
               <a:rPr lang="en-US" smtClean="0"/>
               <a:pPr/>
-              <a:t>2/15/2022</a:t>
+              <a:t>3/19/2022</a:t>
             </a:fld>
             <a:endParaRPr lang="en-US"/>
           </a:p>
@@ -1499,7 +1499,7 @@
           <p:cNvPr id="7" name="Picture 6" descr="E:\websites\free-power-point-templates\2012\logos.png">
             <a:extLst>
               <a:ext uri="{FF2B5EF4-FFF2-40B4-BE49-F238E27FC236}">
-                <a16:creationId xmlns:a16="http://schemas.microsoft.com/office/drawing/2014/main" xmlns="" id="{08B89D22-1D6E-450B-881F-4D2A4C527F72}"/>
+                <a16:creationId xmlns="" xmlns:a16="http://schemas.microsoft.com/office/drawing/2014/main" id="{08B89D22-1D6E-450B-881F-4D2A4C527F72}"/>
               </a:ext>
             </a:extLst>
           </p:cNvPr>
@@ -1739,7 +1739,7 @@
             <a:fld id="{53074F12-AA26-4AC8-9962-C36BB8F32554}" type="datetimeFigureOut">
               <a:rPr lang="en-US" smtClean="0"/>
               <a:pPr/>
-              <a:t>2/15/2022</a:t>
+              <a:t>3/19/2022</a:t>
             </a:fld>
             <a:endParaRPr lang="en-US"/>
           </a:p>
@@ -1998,7 +1998,7 @@
             <a:fld id="{53074F12-AA26-4AC8-9962-C36BB8F32554}" type="datetimeFigureOut">
               <a:rPr lang="en-US" smtClean="0"/>
               <a:pPr/>
-              <a:t>2/15/2022</a:t>
+              <a:t>3/19/2022</a:t>
             </a:fld>
             <a:endParaRPr lang="en-US"/>
           </a:p>
@@ -2257,7 +2257,7 @@
             <a:fld id="{53074F12-AA26-4AC8-9962-C36BB8F32554}" type="datetimeFigureOut">
               <a:rPr lang="en-US" smtClean="0"/>
               <a:pPr/>
-              <a:t>2/15/2022</a:t>
+              <a:t>3/19/2022</a:t>
             </a:fld>
             <a:endParaRPr lang="en-US"/>
           </a:p>
@@ -2556,7 +2556,7 @@
             <a:fld id="{53074F12-AA26-4AC8-9962-C36BB8F32554}" type="datetimeFigureOut">
               <a:rPr lang="en-US" smtClean="0"/>
               <a:pPr/>
-              <a:t>2/15/2022</a:t>
+              <a:t>3/19/2022</a:t>
             </a:fld>
             <a:endParaRPr lang="en-US"/>
           </a:p>
@@ -3055,7 +3055,7 @@
             <a:fld id="{53074F12-AA26-4AC8-9962-C36BB8F32554}" type="datetimeFigureOut">
               <a:rPr lang="en-US" smtClean="0"/>
               <a:pPr/>
-              <a:t>2/15/2022</a:t>
+              <a:t>3/19/2022</a:t>
             </a:fld>
             <a:endParaRPr lang="en-US"/>
           </a:p>
@@ -3186,7 +3186,7 @@
             <a:fld id="{53074F12-AA26-4AC8-9962-C36BB8F32554}" type="datetimeFigureOut">
               <a:rPr lang="en-US" smtClean="0"/>
               <a:pPr/>
-              <a:t>2/15/2022</a:t>
+              <a:t>3/19/2022</a:t>
             </a:fld>
             <a:endParaRPr lang="en-US"/>
           </a:p>
@@ -3295,7 +3295,7 @@
             <a:fld id="{53074F12-AA26-4AC8-9962-C36BB8F32554}" type="datetimeFigureOut">
               <a:rPr lang="en-US" smtClean="0"/>
               <a:pPr/>
-              <a:t>2/15/2022</a:t>
+              <a:t>3/19/2022</a:t>
             </a:fld>
             <a:endParaRPr lang="en-US"/>
           </a:p>
@@ -3584,7 +3584,7 @@
             <a:fld id="{53074F12-AA26-4AC8-9962-C36BB8F32554}" type="datetimeFigureOut">
               <a:rPr lang="en-US" smtClean="0"/>
               <a:pPr/>
-              <a:t>2/15/2022</a:t>
+              <a:t>3/19/2022</a:t>
             </a:fld>
             <a:endParaRPr lang="en-US"/>
           </a:p>
@@ -3818,7 +3818,7 @@
             <a:fld id="{53074F12-AA26-4AC8-9962-C36BB8F32554}" type="datetimeFigureOut">
               <a:rPr lang="en-US" smtClean="0"/>
               <a:pPr/>
-              <a:t>2/15/2022</a:t>
+              <a:t>3/19/2022</a:t>
             </a:fld>
             <a:endParaRPr lang="en-US"/>
           </a:p>
@@ -3908,7 +3908,7 @@
           <p:cNvPr id="7" name="TextBox 6">
             <a:extLst>
               <a:ext uri="{FF2B5EF4-FFF2-40B4-BE49-F238E27FC236}">
-                <a16:creationId xmlns:a16="http://schemas.microsoft.com/office/drawing/2014/main" xmlns="" id="{11E867DF-3DCA-4725-94F0-F2B6BD747A82}"/>
+                <a16:creationId xmlns="" xmlns:a16="http://schemas.microsoft.com/office/drawing/2014/main" id="{11E867DF-3DCA-4725-94F0-F2B6BD747A82}"/>
               </a:ext>
             </a:extLst>
           </p:cNvPr>
@@ -4291,11 +4291,7 @@
             </a:br>
             <a:r>
               <a:rPr lang="en-US" dirty="0" smtClean="0"/>
-              <a:t>AI </a:t>
-            </a:r>
-            <a:r>
-              <a:rPr lang="en-US" dirty="0" smtClean="0"/>
-              <a:t>with Python</a:t>
+              <a:t>AI with Python</a:t>
             </a:r>
             <a:endParaRPr lang="en-US" dirty="0"/>
           </a:p>
@@ -4334,21 +4330,10 @@
               <a:t>Women University </a:t>
             </a:r>
             <a:r>
-              <a:rPr lang="en-GB" sz="1600" dirty="0" err="1" smtClean="0"/>
+              <a:rPr lang="en-GB" sz="1600" smtClean="0"/>
               <a:t>Swabi</a:t>
             </a:r>
             <a:endParaRPr lang="en-GB" sz="1600" dirty="0" smtClean="0"/>
-          </a:p>
-          <a:p>
-            <a:r>
-              <a:rPr lang="en-GB" sz="1600" dirty="0" err="1" smtClean="0"/>
-              <a:t>Abasyn</a:t>
-            </a:r>
-            <a:r>
-              <a:rPr lang="en-GB" sz="1600" dirty="0" smtClean="0"/>
-              <a:t> University Peshawar</a:t>
-            </a:r>
-            <a:endParaRPr lang="en-US" sz="1600" dirty="0"/>
           </a:p>
         </p:txBody>
       </p:sp>

</xml_diff>